<commit_message>
Add explanation of controlling zoom to slides.
</commit_message>
<xml_diff>
--- a/samples/tutorial.pptx
+++ b/samples/tutorial.pptx
@@ -188,7 +188,7 @@
       </p14:sectionLst>
     </p:ext>
     <p:ext uri="{EFAFB233-063F-42B5-8137-9DF3F51BA10A}">
-      <p15:sldGuideLst xmlns="" xmlns:p15="http://schemas.microsoft.com/office/powerpoint/2012/main">
+      <p15:sldGuideLst xmlns:p15="http://schemas.microsoft.com/office/powerpoint/2012/main">
         <p15:guide id="1" orient="horz" pos="2160">
           <p15:clr>
             <a:srgbClr val="A4A3A4"/>
@@ -412,7 +412,7 @@
           <a:p>
             <a:fld id="{3E86CC0F-BBF3-4E07-94E0-0549B7D560A9}" type="datetimeFigureOut">
               <a:rPr lang="en-SG" smtClean="0"/>
-              <a:t>24/2/2014</a:t>
+              <a:t>29/5/2014</a:t>
             </a:fld>
             <a:endParaRPr lang="en-SG"/>
           </a:p>
@@ -1278,7 +1278,7 @@
             <a:fld id="{1D8BD707-D9CF-40AE-B4C6-C98DA3205C09}" type="datetimeFigureOut">
               <a:rPr lang="en-US" smtClean="0"/>
               <a:pPr/>
-              <a:t>2/24/2014</a:t>
+              <a:t>5/29/2014</a:t>
             </a:fld>
             <a:endParaRPr lang="en-US"/>
           </a:p>
@@ -1445,7 +1445,7 @@
             <a:fld id="{1D8BD707-D9CF-40AE-B4C6-C98DA3205C09}" type="datetimeFigureOut">
               <a:rPr lang="en-US" smtClean="0"/>
               <a:pPr/>
-              <a:t>2/24/2014</a:t>
+              <a:t>5/29/2014</a:t>
             </a:fld>
             <a:endParaRPr lang="en-US"/>
           </a:p>
@@ -1622,7 +1622,7 @@
             <a:fld id="{1D8BD707-D9CF-40AE-B4C6-C98DA3205C09}" type="datetimeFigureOut">
               <a:rPr lang="en-US" smtClean="0"/>
               <a:pPr/>
-              <a:t>2/24/2014</a:t>
+              <a:t>5/29/2014</a:t>
             </a:fld>
             <a:endParaRPr lang="en-US"/>
           </a:p>
@@ -1789,7 +1789,7 @@
             <a:fld id="{1D8BD707-D9CF-40AE-B4C6-C98DA3205C09}" type="datetimeFigureOut">
               <a:rPr lang="en-US" smtClean="0"/>
               <a:pPr/>
-              <a:t>2/24/2014</a:t>
+              <a:t>5/29/2014</a:t>
             </a:fld>
             <a:endParaRPr lang="en-US"/>
           </a:p>
@@ -2032,7 +2032,7 @@
             <a:fld id="{1D8BD707-D9CF-40AE-B4C6-C98DA3205C09}" type="datetimeFigureOut">
               <a:rPr lang="en-US" smtClean="0"/>
               <a:pPr/>
-              <a:t>2/24/2014</a:t>
+              <a:t>5/29/2014</a:t>
             </a:fld>
             <a:endParaRPr lang="en-US"/>
           </a:p>
@@ -2317,7 +2317,7 @@
             <a:fld id="{1D8BD707-D9CF-40AE-B4C6-C98DA3205C09}" type="datetimeFigureOut">
               <a:rPr lang="en-US" smtClean="0"/>
               <a:pPr/>
-              <a:t>2/24/2014</a:t>
+              <a:t>5/29/2014</a:t>
             </a:fld>
             <a:endParaRPr lang="en-US"/>
           </a:p>
@@ -2736,7 +2736,7 @@
             <a:fld id="{1D8BD707-D9CF-40AE-B4C6-C98DA3205C09}" type="datetimeFigureOut">
               <a:rPr lang="en-US" smtClean="0"/>
               <a:pPr/>
-              <a:t>2/24/2014</a:t>
+              <a:t>5/29/2014</a:t>
             </a:fld>
             <a:endParaRPr lang="en-US"/>
           </a:p>
@@ -2851,7 +2851,7 @@
             <a:fld id="{1D8BD707-D9CF-40AE-B4C6-C98DA3205C09}" type="datetimeFigureOut">
               <a:rPr lang="en-US" smtClean="0"/>
               <a:pPr/>
-              <a:t>2/24/2014</a:t>
+              <a:t>5/29/2014</a:t>
             </a:fld>
             <a:endParaRPr lang="en-US"/>
           </a:p>
@@ -2943,7 +2943,7 @@
             <a:fld id="{1D8BD707-D9CF-40AE-B4C6-C98DA3205C09}" type="datetimeFigureOut">
               <a:rPr lang="en-US" smtClean="0"/>
               <a:pPr/>
-              <a:t>2/24/2014</a:t>
+              <a:t>5/29/2014</a:t>
             </a:fld>
             <a:endParaRPr lang="en-US"/>
           </a:p>
@@ -3217,7 +3217,7 @@
             <a:fld id="{1D8BD707-D9CF-40AE-B4C6-C98DA3205C09}" type="datetimeFigureOut">
               <a:rPr lang="en-US" smtClean="0"/>
               <a:pPr/>
-              <a:t>2/24/2014</a:t>
+              <a:t>5/29/2014</a:t>
             </a:fld>
             <a:endParaRPr lang="en-US"/>
           </a:p>
@@ -3467,7 +3467,7 @@
             <a:fld id="{1D8BD707-D9CF-40AE-B4C6-C98DA3205C09}" type="datetimeFigureOut">
               <a:rPr lang="en-US" smtClean="0"/>
               <a:pPr/>
-              <a:t>2/24/2014</a:t>
+              <a:t>5/29/2014</a:t>
             </a:fld>
             <a:endParaRPr lang="en-US"/>
           </a:p>
@@ -3677,7 +3677,7 @@
             <a:fld id="{1D8BD707-D9CF-40AE-B4C6-C98DA3205C09}" type="datetimeFigureOut">
               <a:rPr lang="en-US" smtClean="0"/>
               <a:pPr/>
-              <a:t>2/24/2014</a:t>
+              <a:t>5/29/2014</a:t>
             </a:fld>
             <a:endParaRPr lang="en-US"/>
           </a:p>
@@ -6894,17 +6894,7 @@
                   </a:schemeClr>
                 </a:solidFill>
               </a:rPr>
-              <a:t>features </a:t>
-            </a:r>
-            <a:r>
-              <a:rPr lang="en-US" dirty="0" smtClean="0">
-                <a:solidFill>
-                  <a:schemeClr val="accent6">
-                    <a:lumMod val="75000"/>
-                  </a:schemeClr>
-                </a:solidFill>
-              </a:rPr>
-              <a:t>are next.</a:t>
+              <a:t>features are next.</a:t>
             </a:r>
             <a:endParaRPr lang="en-SG" dirty="0">
               <a:solidFill>
@@ -7339,47 +7329,27 @@
                   </a:schemeClr>
                 </a:solidFill>
               </a:rPr>
-              <a:t> Select the blue rectangle and click  the                </a:t>
-            </a:r>
-            <a:r>
-              <a:rPr lang="en-US" dirty="0" smtClean="0">
+              <a:t> Select the blue rectangle and click  the                 </a:t>
+            </a:r>
+            <a:r>
+              <a:rPr lang="en-US" i="1" dirty="0" smtClean="0">
                 <a:solidFill>
                   <a:schemeClr val="accent6">
                     <a:lumMod val="75000"/>
                   </a:schemeClr>
                 </a:solidFill>
               </a:rPr>
-              <a:t> </a:t>
-            </a:r>
-            <a:r>
-              <a:rPr lang="en-US" i="1" dirty="0" smtClean="0">
+              <a:t>zoom to area</a:t>
+            </a:r>
+            <a:r>
+              <a:rPr lang="en-US" dirty="0" smtClean="0">
                 <a:solidFill>
                   <a:schemeClr val="accent6">
                     <a:lumMod val="75000"/>
                   </a:schemeClr>
                 </a:solidFill>
               </a:rPr>
-              <a:t>zoom to area</a:t>
-            </a:r>
-            <a:r>
-              <a:rPr lang="en-US" dirty="0" smtClean="0">
-                <a:solidFill>
-                  <a:schemeClr val="accent6">
-                    <a:lumMod val="75000"/>
-                  </a:schemeClr>
-                </a:solidFill>
-              </a:rPr>
-              <a:t> button</a:t>
-            </a:r>
-            <a:r>
-              <a:rPr lang="en-US" dirty="0" smtClean="0">
-                <a:solidFill>
-                  <a:schemeClr val="accent6">
-                    <a:lumMod val="75000"/>
-                  </a:schemeClr>
-                </a:solidFill>
-              </a:rPr>
-              <a:t>.</a:t>
+              <a:t> button.</a:t>
             </a:r>
             <a:endParaRPr lang="en-SG" dirty="0">
               <a:solidFill>
@@ -7400,7 +7370,7 @@
         <p:spPr>
           <a:xfrm>
             <a:off x="495300" y="5323582"/>
-            <a:ext cx="8001000" cy="1077218"/>
+            <a:ext cx="8001000" cy="1354217"/>
           </a:xfrm>
           <a:prstGeom prst="rect">
             <a:avLst/>
@@ -7441,37 +7411,37 @@
                   </a:schemeClr>
                 </a:solidFill>
               </a:rPr>
-              <a:t>zoom </a:t>
-            </a:r>
-            <a:r>
-              <a:rPr lang="en-US" i="1" dirty="0" smtClean="0">
+              <a:t>zoom to area </a:t>
+            </a:r>
+            <a:r>
+              <a:rPr lang="en-US" dirty="0" smtClean="0">
                 <a:solidFill>
                   <a:schemeClr val="accent6">
                     <a:lumMod val="75000"/>
                   </a:schemeClr>
                 </a:solidFill>
               </a:rPr>
-              <a:t>to area </a:t>
-            </a:r>
-            <a:r>
-              <a:rPr lang="en-US" dirty="0" smtClean="0">
+              <a:t>effect generated by </a:t>
+            </a:r>
+            <a:r>
+              <a:rPr lang="en-US" dirty="0" err="1" smtClean="0">
                 <a:solidFill>
                   <a:schemeClr val="accent6">
                     <a:lumMod val="75000"/>
                   </a:schemeClr>
                 </a:solidFill>
               </a:rPr>
-              <a:t>effect generated by </a:t>
-            </a:r>
-            <a:r>
-              <a:rPr lang="en-US" dirty="0" err="1" smtClean="0">
+              <a:t>PowerPointLabs</a:t>
+            </a:r>
+            <a:r>
+              <a:rPr lang="en-US" dirty="0" smtClean="0">
                 <a:solidFill>
                   <a:schemeClr val="accent6">
                     <a:lumMod val="75000"/>
                   </a:schemeClr>
                 </a:solidFill>
               </a:rPr>
-              <a:t>PowerPointLabs</a:t>
+              <a:t>. It generates one slide to zoom in to the area marked by the rectangle as well as another slide to reverse the </a:t>
             </a:r>
             <a:r>
               <a:rPr lang="en-US" dirty="0" smtClean="0">
@@ -7481,27 +7451,7 @@
                   </a:schemeClr>
                 </a:solidFill>
               </a:rPr>
-              <a:t>. </a:t>
-            </a:r>
-            <a:r>
-              <a:rPr lang="en-US" dirty="0" smtClean="0">
-                <a:solidFill>
-                  <a:schemeClr val="accent6">
-                    <a:lumMod val="75000"/>
-                  </a:schemeClr>
-                </a:solidFill>
-              </a:rPr>
-              <a:t>It generates one slide to zoom in to the area marked by the rectangle as well as another slide to reverse the zooming</a:t>
-            </a:r>
-            <a:r>
-              <a:rPr lang="en-US" dirty="0" smtClean="0">
-                <a:solidFill>
-                  <a:schemeClr val="accent6">
-                    <a:lumMod val="75000"/>
-                  </a:schemeClr>
-                </a:solidFill>
-              </a:rPr>
-              <a:t>.</a:t>
+              <a:t>effect. To zoom in more, make the rectangle smaller – to zoom less, make it bigger.</a:t>
             </a:r>
             <a:endParaRPr lang="en-SG" dirty="0">
               <a:solidFill>
@@ -8981,17 +8931,7 @@
                   </a:schemeClr>
                 </a:solidFill>
               </a:rPr>
-              <a:t> </a:t>
-            </a:r>
-            <a:r>
-              <a:rPr lang="en-US" dirty="0" smtClean="0">
-                <a:solidFill>
-                  <a:schemeClr val="accent6">
-                    <a:lumMod val="75000"/>
-                  </a:schemeClr>
-                </a:solidFill>
-              </a:rPr>
-              <a:t>Select the blue rectangle and click  the                button.</a:t>
+              <a:t> Select the blue rectangle and click  the                button.</a:t>
             </a:r>
             <a:endParaRPr lang="en-SG" dirty="0">
               <a:solidFill>
@@ -9043,37 +8983,37 @@
                   </a:schemeClr>
                 </a:solidFill>
               </a:rPr>
-              <a:t> </a:t>
-            </a:r>
-            <a:r>
-              <a:rPr lang="en-US" dirty="0" smtClean="0">
+              <a:t> ‘Play’ the slide show (      ) to see </a:t>
+            </a:r>
+            <a:r>
+              <a:rPr lang="en-US" i="1" dirty="0" smtClean="0">
                 <a:solidFill>
                   <a:schemeClr val="accent6">
                     <a:lumMod val="75000"/>
                   </a:schemeClr>
                 </a:solidFill>
               </a:rPr>
-              <a:t>‘Play’ the slide show (      ) to see </a:t>
-            </a:r>
-            <a:r>
-              <a:rPr lang="en-US" i="1" dirty="0" smtClean="0">
+              <a:t>drill down </a:t>
+            </a:r>
+            <a:r>
+              <a:rPr lang="en-US" dirty="0" smtClean="0">
                 <a:solidFill>
                   <a:schemeClr val="accent6">
                     <a:lumMod val="75000"/>
                   </a:schemeClr>
                 </a:solidFill>
               </a:rPr>
-              <a:t>drill down </a:t>
-            </a:r>
-            <a:r>
-              <a:rPr lang="en-US" dirty="0" smtClean="0">
+              <a:t>effect generated by </a:t>
+            </a:r>
+            <a:r>
+              <a:rPr lang="en-US" dirty="0" err="1" smtClean="0">
                 <a:solidFill>
                   <a:schemeClr val="accent6">
                     <a:lumMod val="75000"/>
                   </a:schemeClr>
                 </a:solidFill>
               </a:rPr>
-              <a:t>effect </a:t>
+              <a:t>PowerPointLabs</a:t>
             </a:r>
             <a:r>
               <a:rPr lang="en-US" dirty="0" smtClean="0">
@@ -9083,57 +9023,7 @@
                   </a:schemeClr>
                 </a:solidFill>
               </a:rPr>
-              <a:t>generated by </a:t>
-            </a:r>
-            <a:r>
-              <a:rPr lang="en-US" dirty="0" err="1" smtClean="0">
-                <a:solidFill>
-                  <a:schemeClr val="accent6">
-                    <a:lumMod val="75000"/>
-                  </a:schemeClr>
-                </a:solidFill>
-              </a:rPr>
-              <a:t>PowerPointLabs</a:t>
-            </a:r>
-            <a:r>
-              <a:rPr lang="en-US" dirty="0" smtClean="0">
-                <a:solidFill>
-                  <a:schemeClr val="accent6">
-                    <a:lumMod val="75000"/>
-                  </a:schemeClr>
-                </a:solidFill>
-              </a:rPr>
-              <a:t>. The effect tells the audience which part of this slide corresponds to the content of the next </a:t>
-            </a:r>
-            <a:r>
-              <a:rPr lang="en-US" dirty="0" smtClean="0">
-                <a:solidFill>
-                  <a:schemeClr val="accent6">
-                    <a:lumMod val="75000"/>
-                  </a:schemeClr>
-                </a:solidFill>
-              </a:rPr>
-              <a:t>slide. For example, here it gives audience the </a:t>
-            </a:r>
-            <a:r>
-              <a:rPr lang="en-US" dirty="0" smtClean="0">
-                <a:solidFill>
-                  <a:schemeClr val="accent6">
-                    <a:lumMod val="75000"/>
-                  </a:schemeClr>
-                </a:solidFill>
-              </a:rPr>
-              <a:t>feeling that you are now drilling down to details about the ‘Process’ part of this slide</a:t>
-            </a:r>
-            <a:r>
-              <a:rPr lang="en-US" dirty="0" smtClean="0">
-                <a:solidFill>
-                  <a:schemeClr val="accent6">
-                    <a:lumMod val="75000"/>
-                  </a:schemeClr>
-                </a:solidFill>
-              </a:rPr>
-              <a:t>.</a:t>
+              <a:t>. The effect tells the audience which part of this slide corresponds to the content of the next slide. For example, here it gives audience the feeling that you are now drilling down to details about the ‘Process’ part of this slide.</a:t>
             </a:r>
             <a:endParaRPr lang="en-SG" dirty="0">
               <a:solidFill>
@@ -10690,47 +10580,27 @@
                   </a:schemeClr>
                 </a:solidFill>
               </a:rPr>
-              <a:t> </a:t>
-            </a:r>
-            <a:r>
-              <a:rPr lang="en-US" dirty="0" smtClean="0">
+              <a:t> Select the blue rectangle and click  the              button to generate a </a:t>
+            </a:r>
+            <a:r>
+              <a:rPr lang="en-US" i="1" dirty="0" smtClean="0">
                 <a:solidFill>
                   <a:schemeClr val="accent6">
                     <a:lumMod val="75000"/>
                   </a:schemeClr>
                 </a:solidFill>
               </a:rPr>
-              <a:t>Select the blue rectangle and click  the              button to generate a </a:t>
-            </a:r>
-            <a:r>
-              <a:rPr lang="en-US" i="1" dirty="0" smtClean="0">
+              <a:t>step back </a:t>
+            </a:r>
+            <a:r>
+              <a:rPr lang="en-US" dirty="0" smtClean="0">
                 <a:solidFill>
                   <a:schemeClr val="accent6">
                     <a:lumMod val="75000"/>
                   </a:schemeClr>
                 </a:solidFill>
               </a:rPr>
-              <a:t>step back </a:t>
-            </a:r>
-            <a:r>
-              <a:rPr lang="en-US" dirty="0" smtClean="0">
-                <a:solidFill>
-                  <a:schemeClr val="accent6">
-                    <a:lumMod val="75000"/>
-                  </a:schemeClr>
-                </a:solidFill>
-              </a:rPr>
-              <a:t>effect </a:t>
-            </a:r>
-            <a:r>
-              <a:rPr lang="en-US" dirty="0" smtClean="0">
-                <a:solidFill>
-                  <a:schemeClr val="accent6">
-                    <a:lumMod val="75000"/>
-                  </a:schemeClr>
-                </a:solidFill>
-              </a:rPr>
-              <a:t>from the previous slide.</a:t>
+              <a:t>effect from the previous slide.</a:t>
             </a:r>
             <a:endParaRPr lang="en-SG" dirty="0">
               <a:solidFill>
@@ -10782,17 +10652,17 @@
                   </a:schemeClr>
                 </a:solidFill>
               </a:rPr>
-              <a:t> </a:t>
-            </a:r>
-            <a:r>
-              <a:rPr lang="en-US" dirty="0" smtClean="0">
+              <a:t> Go back a couple of slides and ‘play’ the slide show to see the </a:t>
+            </a:r>
+            <a:r>
+              <a:rPr lang="en-US" i="1" dirty="0" smtClean="0">
                 <a:solidFill>
                   <a:schemeClr val="accent6">
                     <a:lumMod val="75000"/>
                   </a:schemeClr>
                 </a:solidFill>
               </a:rPr>
-              <a:t>Go back a couple of slides and ‘play’ the slide show to </a:t>
+              <a:t>step back </a:t>
             </a:r>
             <a:r>
               <a:rPr lang="en-US" dirty="0" smtClean="0">
@@ -10802,47 +10672,7 @@
                   </a:schemeClr>
                 </a:solidFill>
               </a:rPr>
-              <a:t>see the </a:t>
-            </a:r>
-            <a:r>
-              <a:rPr lang="en-US" i="1" dirty="0" smtClean="0">
-                <a:solidFill>
-                  <a:schemeClr val="accent6">
-                    <a:lumMod val="75000"/>
-                  </a:schemeClr>
-                </a:solidFill>
-              </a:rPr>
-              <a:t>step back </a:t>
-            </a:r>
-            <a:r>
-              <a:rPr lang="en-US" dirty="0" smtClean="0">
-                <a:solidFill>
-                  <a:schemeClr val="accent6">
-                    <a:lumMod val="75000"/>
-                  </a:schemeClr>
-                </a:solidFill>
-              </a:rPr>
-              <a:t>effect </a:t>
-            </a:r>
-            <a:r>
-              <a:rPr lang="en-US" dirty="0" smtClean="0">
-                <a:solidFill>
-                  <a:schemeClr val="accent6">
-                    <a:lumMod val="75000"/>
-                  </a:schemeClr>
-                </a:solidFill>
-              </a:rPr>
-              <a:t>generated</a:t>
-            </a:r>
-            <a:r>
-              <a:rPr lang="en-US" dirty="0" smtClean="0">
-                <a:solidFill>
-                  <a:schemeClr val="accent6">
-                    <a:lumMod val="75000"/>
-                  </a:schemeClr>
-                </a:solidFill>
-              </a:rPr>
-              <a:t>. This effect can be used to indicate that you are stepping back to take a look at where the details you have been discussing fit into the big picture.</a:t>
+              <a:t>effect generated. This effect can be used to indicate that you are stepping back to take a look at where the details you have been discussing fit into the big picture.</a:t>
             </a:r>
             <a:endParaRPr lang="en-SG" dirty="0">
               <a:solidFill>
@@ -11000,17 +10830,7 @@
                   </a:schemeClr>
                 </a:solidFill>
               </a:rPr>
-              <a:t> </a:t>
-            </a:r>
-            <a:r>
-              <a:rPr lang="en-US" dirty="0" smtClean="0">
-                <a:solidFill>
-                  <a:schemeClr val="accent6">
-                    <a:lumMod val="75000"/>
-                  </a:schemeClr>
-                </a:solidFill>
-              </a:rPr>
-              <a:t>feature</a:t>
+              <a:t> feature</a:t>
             </a:r>
             <a:endParaRPr lang="en-SG" dirty="0">
               <a:solidFill>
@@ -11424,9 +11244,9 @@
                   </a:schemeClr>
                 </a:solidFill>
               </a:rPr>
-              <a:t> </a:t>
-            </a:r>
-            <a:r>
+              <a:t> Select the blue shapes (ctrl + click) and click the                 button. </a:t>
+            </a:r>
+            <a:br>
               <a:rPr lang="en-US" dirty="0" smtClean="0">
                 <a:solidFill>
                   <a:schemeClr val="accent6">
@@ -11434,8 +11254,7 @@
                   </a:schemeClr>
                 </a:solidFill>
               </a:rPr>
-              <a:t>Select the blue shap</a:t>
-            </a:r>
+            </a:br>
             <a:r>
               <a:rPr lang="en-US" dirty="0" smtClean="0">
                 <a:solidFill>
@@ -11444,9 +11263,9 @@
                   </a:schemeClr>
                 </a:solidFill>
               </a:rPr>
-              <a:t>es (ctrl + click) and c</a:t>
-            </a:r>
-            <a:r>
+              <a:t/>
+            </a:r>
+            <a:br>
               <a:rPr lang="en-US" dirty="0" smtClean="0">
                 <a:solidFill>
                   <a:schemeClr val="accent6">
@@ -11454,8 +11273,7 @@
                   </a:schemeClr>
                 </a:solidFill>
               </a:rPr>
-              <a:t>lick </a:t>
-            </a:r>
+            </a:br>
             <a:r>
               <a:rPr lang="en-US" dirty="0" smtClean="0">
                 <a:solidFill>
@@ -11464,7 +11282,7 @@
                   </a:schemeClr>
                 </a:solidFill>
               </a:rPr>
-              <a:t>the                 button. </a:t>
+              <a:t/>
             </a:r>
             <a:br>
               <a:rPr lang="en-US" dirty="0" smtClean="0">
@@ -11483,55 +11301,7 @@
                   </a:schemeClr>
                 </a:solidFill>
               </a:rPr>
-              <a:t/>
-            </a:r>
-            <a:br>
-              <a:rPr lang="en-US" dirty="0" smtClean="0">
-                <a:solidFill>
-                  <a:schemeClr val="accent6">
-                    <a:lumMod val="75000"/>
-                  </a:schemeClr>
-                </a:solidFill>
-              </a:rPr>
-            </a:br>
-            <a:r>
-              <a:rPr lang="en-US" dirty="0" smtClean="0">
-                <a:solidFill>
-                  <a:schemeClr val="accent6">
-                    <a:lumMod val="75000"/>
-                  </a:schemeClr>
-                </a:solidFill>
-              </a:rPr>
-              <a:t/>
-            </a:r>
-            <a:br>
-              <a:rPr lang="en-US" dirty="0" smtClean="0">
-                <a:solidFill>
-                  <a:schemeClr val="accent6">
-                    <a:lumMod val="75000"/>
-                  </a:schemeClr>
-                </a:solidFill>
-              </a:rPr>
-            </a:br>
-            <a:r>
-              <a:rPr lang="en-US" dirty="0" smtClean="0">
-                <a:solidFill>
-                  <a:schemeClr val="accent6">
-                    <a:lumMod val="75000"/>
-                  </a:schemeClr>
-                </a:solidFill>
-              </a:rPr>
-              <a:t>It will </a:t>
-            </a:r>
-            <a:r>
-              <a:rPr lang="en-US" dirty="0" smtClean="0">
-                <a:solidFill>
-                  <a:schemeClr val="accent6">
-                    <a:lumMod val="75000"/>
-                  </a:schemeClr>
-                </a:solidFill>
-              </a:rPr>
-              <a:t>crop the images behind to match the outlines of the shapes.</a:t>
+              <a:t>It will crop the images behind to match the outlines of the shapes.</a:t>
             </a:r>
             <a:endParaRPr lang="en-SG" dirty="0">
               <a:solidFill>
@@ -12259,27 +12029,7 @@
                   </a:schemeClr>
                 </a:solidFill>
               </a:rPr>
-              <a:t> You can apply other default PowerPoint effects such as soft-edges to enhance the resultin</a:t>
-            </a:r>
-            <a:r>
-              <a:rPr lang="en-US" dirty="0" smtClean="0">
-                <a:solidFill>
-                  <a:schemeClr val="accent6">
-                    <a:lumMod val="75000"/>
-                  </a:schemeClr>
-                </a:solidFill>
-              </a:rPr>
-              <a:t>g cropped image even further</a:t>
-            </a:r>
-            <a:r>
-              <a:rPr lang="en-US" dirty="0" smtClean="0">
-                <a:solidFill>
-                  <a:schemeClr val="accent6">
-                    <a:lumMod val="75000"/>
-                  </a:schemeClr>
-                </a:solidFill>
-              </a:rPr>
-              <a:t>.</a:t>
+              <a:t> You can apply other default PowerPoint effects such as soft-edges to enhance the resulting cropped image even further.</a:t>
             </a:r>
             <a:endParaRPr lang="en-SG" dirty="0">
               <a:solidFill>
@@ -12347,15 +12097,6 @@
                 <a:headEnd/>
                 <a:tailEnd/>
               </a14:hiddenLine>
-            </a:ext>
-            <a:ext uri="{AF507438-7753-43E0-B8FC-AC1667EBCBE1}">
-              <a14:hiddenEffects xmlns:a14="http://schemas.microsoft.com/office/drawing/2010/main">
-                <a:effectLst>
-                  <a:outerShdw dist="35921" dir="2700000" algn="ctr" rotWithShape="0">
-                    <a:schemeClr val="bg2"/>
-                  </a:outerShdw>
-                </a:effectLst>
-              </a14:hiddenEffects>
             </a:ext>
           </a:extLst>
         </p:spPr>

</xml_diff>

<commit_message>
update docs to match website changes
</commit_message>
<xml_diff>
--- a/samples/tutorial.pptx
+++ b/samples/tutorial.pptx
@@ -444,7 +444,7 @@
           <a:p>
             <a:fld id="{3E86CC0F-BBF3-4E07-94E0-0549B7D560A9}" type="datetimeFigureOut">
               <a:rPr lang="en-SG" smtClean="0"/>
-              <a:t>29/6/2016</a:t>
+              <a:t>18/2/2017</a:t>
             </a:fld>
             <a:endParaRPr lang="en-SG"/>
           </a:p>
@@ -1583,7 +1583,7 @@
             <a:fld id="{1D8BD707-D9CF-40AE-B4C6-C98DA3205C09}" type="datetimeFigureOut">
               <a:rPr lang="en-US" smtClean="0"/>
               <a:pPr/>
-              <a:t>6/29/2016</a:t>
+              <a:t>2/18/2017</a:t>
             </a:fld>
             <a:endParaRPr lang="en-US"/>
           </a:p>
@@ -1750,7 +1750,7 @@
             <a:fld id="{1D8BD707-D9CF-40AE-B4C6-C98DA3205C09}" type="datetimeFigureOut">
               <a:rPr lang="en-US" smtClean="0"/>
               <a:pPr/>
-              <a:t>6/29/2016</a:t>
+              <a:t>2/18/2017</a:t>
             </a:fld>
             <a:endParaRPr lang="en-US"/>
           </a:p>
@@ -1927,7 +1927,7 @@
             <a:fld id="{1D8BD707-D9CF-40AE-B4C6-C98DA3205C09}" type="datetimeFigureOut">
               <a:rPr lang="en-US" smtClean="0"/>
               <a:pPr/>
-              <a:t>6/29/2016</a:t>
+              <a:t>2/18/2017</a:t>
             </a:fld>
             <a:endParaRPr lang="en-US"/>
           </a:p>
@@ -2094,7 +2094,7 @@
             <a:fld id="{1D8BD707-D9CF-40AE-B4C6-C98DA3205C09}" type="datetimeFigureOut">
               <a:rPr lang="en-US" smtClean="0"/>
               <a:pPr/>
-              <a:t>6/29/2016</a:t>
+              <a:t>2/18/2017</a:t>
             </a:fld>
             <a:endParaRPr lang="en-US"/>
           </a:p>
@@ -2337,7 +2337,7 @@
             <a:fld id="{1D8BD707-D9CF-40AE-B4C6-C98DA3205C09}" type="datetimeFigureOut">
               <a:rPr lang="en-US" smtClean="0"/>
               <a:pPr/>
-              <a:t>6/29/2016</a:t>
+              <a:t>2/18/2017</a:t>
             </a:fld>
             <a:endParaRPr lang="en-US"/>
           </a:p>
@@ -2622,7 +2622,7 @@
             <a:fld id="{1D8BD707-D9CF-40AE-B4C6-C98DA3205C09}" type="datetimeFigureOut">
               <a:rPr lang="en-US" smtClean="0"/>
               <a:pPr/>
-              <a:t>6/29/2016</a:t>
+              <a:t>2/18/2017</a:t>
             </a:fld>
             <a:endParaRPr lang="en-US"/>
           </a:p>
@@ -3041,7 +3041,7 @@
             <a:fld id="{1D8BD707-D9CF-40AE-B4C6-C98DA3205C09}" type="datetimeFigureOut">
               <a:rPr lang="en-US" smtClean="0"/>
               <a:pPr/>
-              <a:t>6/29/2016</a:t>
+              <a:t>2/18/2017</a:t>
             </a:fld>
             <a:endParaRPr lang="en-US"/>
           </a:p>
@@ -3156,7 +3156,7 @@
             <a:fld id="{1D8BD707-D9CF-40AE-B4C6-C98DA3205C09}" type="datetimeFigureOut">
               <a:rPr lang="en-US" smtClean="0"/>
               <a:pPr/>
-              <a:t>6/29/2016</a:t>
+              <a:t>2/18/2017</a:t>
             </a:fld>
             <a:endParaRPr lang="en-US"/>
           </a:p>
@@ -3248,7 +3248,7 @@
             <a:fld id="{1D8BD707-D9CF-40AE-B4C6-C98DA3205C09}" type="datetimeFigureOut">
               <a:rPr lang="en-US" smtClean="0"/>
               <a:pPr/>
-              <a:t>6/29/2016</a:t>
+              <a:t>2/18/2017</a:t>
             </a:fld>
             <a:endParaRPr lang="en-US"/>
           </a:p>
@@ -3522,7 +3522,7 @@
             <a:fld id="{1D8BD707-D9CF-40AE-B4C6-C98DA3205C09}" type="datetimeFigureOut">
               <a:rPr lang="en-US" smtClean="0"/>
               <a:pPr/>
-              <a:t>6/29/2016</a:t>
+              <a:t>2/18/2017</a:t>
             </a:fld>
             <a:endParaRPr lang="en-US"/>
           </a:p>
@@ -3772,7 +3772,7 @@
             <a:fld id="{1D8BD707-D9CF-40AE-B4C6-C98DA3205C09}" type="datetimeFigureOut">
               <a:rPr lang="en-US" smtClean="0"/>
               <a:pPr/>
-              <a:t>6/29/2016</a:t>
+              <a:t>2/18/2017</a:t>
             </a:fld>
             <a:endParaRPr lang="en-US"/>
           </a:p>
@@ -3982,7 +3982,7 @@
             <a:fld id="{1D8BD707-D9CF-40AE-B4C6-C98DA3205C09}" type="datetimeFigureOut">
               <a:rPr lang="en-US" smtClean="0"/>
               <a:pPr/>
-              <a:t>6/29/2016</a:t>
+              <a:t>2/18/2017</a:t>
             </a:fld>
             <a:endParaRPr lang="en-US"/>
           </a:p>
@@ -17375,7 +17375,7 @@
                   </a:schemeClr>
                 </a:solidFill>
               </a:rPr>
-              <a:t>Documentation</a:t>
+              <a:t>User Guide </a:t>
             </a:r>
             <a:r>
               <a:rPr lang="en-US" dirty="0" smtClean="0">
@@ -17385,7 +17385,17 @@
                   </a:schemeClr>
                 </a:solidFill>
               </a:rPr>
-              <a:t> page of </a:t>
+              <a:t>page </a:t>
+            </a:r>
+            <a:r>
+              <a:rPr lang="en-US" dirty="0" smtClean="0">
+                <a:solidFill>
+                  <a:schemeClr val="accent6">
+                    <a:lumMod val="75000"/>
+                  </a:schemeClr>
+                </a:solidFill>
+              </a:rPr>
+              <a:t>of </a:t>
             </a:r>
             <a:r>
               <a:rPr lang="en-US" dirty="0" smtClean="0">
@@ -20029,7 +20039,7 @@
                 </a:solidFill>
                 <a:hlinkClick r:id="rId2"/>
               </a:rPr>
-              <a:t>documentation on our website</a:t>
+              <a:t>user guide on our website</a:t>
             </a:r>
             <a:r>
               <a:rPr lang="en-US" dirty="0" smtClean="0">
@@ -20041,6 +20051,13 @@
               </a:rPr>
               <a:t>.</a:t>
             </a:r>
+            <a:endParaRPr lang="en-US" dirty="0" smtClean="0">
+              <a:solidFill>
+                <a:schemeClr val="accent6">
+                  <a:lumMod val="75000"/>
+                </a:schemeClr>
+              </a:solidFill>
+            </a:endParaRPr>
           </a:p>
           <a:p>
             <a:pPr algn="ctr"/>
@@ -22318,7 +22335,7 @@
                 </a:solidFill>
                 <a:hlinkClick r:id="rId3"/>
               </a:rPr>
-              <a:t>http://PowerPointLabs.info/docs.html</a:t>
+              <a:t>http://</a:t>
             </a:r>
             <a:r>
               <a:rPr lang="en-US" dirty="0" smtClean="0">
@@ -22327,8 +22344,9 @@
                     <a:lumMod val="75000"/>
                   </a:schemeClr>
                 </a:solidFill>
-              </a:rPr>
-              <a:t>  </a:t>
+                <a:hlinkClick r:id="rId3"/>
+              </a:rPr>
+              <a:t>PowerPointLabs.info/docs/</a:t>
             </a:r>
             <a:endParaRPr lang="en-SG" dirty="0">
               <a:solidFill>

</xml_diff>

<commit_message>
update docs to match website changes (#50)
</commit_message>
<xml_diff>
--- a/samples/tutorial.pptx
+++ b/samples/tutorial.pptx
@@ -444,7 +444,7 @@
           <a:p>
             <a:fld id="{3E86CC0F-BBF3-4E07-94E0-0549B7D560A9}" type="datetimeFigureOut">
               <a:rPr lang="en-SG" smtClean="0"/>
-              <a:t>29/6/2016</a:t>
+              <a:t>18/2/2017</a:t>
             </a:fld>
             <a:endParaRPr lang="en-SG"/>
           </a:p>
@@ -1583,7 +1583,7 @@
             <a:fld id="{1D8BD707-D9CF-40AE-B4C6-C98DA3205C09}" type="datetimeFigureOut">
               <a:rPr lang="en-US" smtClean="0"/>
               <a:pPr/>
-              <a:t>6/29/2016</a:t>
+              <a:t>2/18/2017</a:t>
             </a:fld>
             <a:endParaRPr lang="en-US"/>
           </a:p>
@@ -1750,7 +1750,7 @@
             <a:fld id="{1D8BD707-D9CF-40AE-B4C6-C98DA3205C09}" type="datetimeFigureOut">
               <a:rPr lang="en-US" smtClean="0"/>
               <a:pPr/>
-              <a:t>6/29/2016</a:t>
+              <a:t>2/18/2017</a:t>
             </a:fld>
             <a:endParaRPr lang="en-US"/>
           </a:p>
@@ -1927,7 +1927,7 @@
             <a:fld id="{1D8BD707-D9CF-40AE-B4C6-C98DA3205C09}" type="datetimeFigureOut">
               <a:rPr lang="en-US" smtClean="0"/>
               <a:pPr/>
-              <a:t>6/29/2016</a:t>
+              <a:t>2/18/2017</a:t>
             </a:fld>
             <a:endParaRPr lang="en-US"/>
           </a:p>
@@ -2094,7 +2094,7 @@
             <a:fld id="{1D8BD707-D9CF-40AE-B4C6-C98DA3205C09}" type="datetimeFigureOut">
               <a:rPr lang="en-US" smtClean="0"/>
               <a:pPr/>
-              <a:t>6/29/2016</a:t>
+              <a:t>2/18/2017</a:t>
             </a:fld>
             <a:endParaRPr lang="en-US"/>
           </a:p>
@@ -2337,7 +2337,7 @@
             <a:fld id="{1D8BD707-D9CF-40AE-B4C6-C98DA3205C09}" type="datetimeFigureOut">
               <a:rPr lang="en-US" smtClean="0"/>
               <a:pPr/>
-              <a:t>6/29/2016</a:t>
+              <a:t>2/18/2017</a:t>
             </a:fld>
             <a:endParaRPr lang="en-US"/>
           </a:p>
@@ -2622,7 +2622,7 @@
             <a:fld id="{1D8BD707-D9CF-40AE-B4C6-C98DA3205C09}" type="datetimeFigureOut">
               <a:rPr lang="en-US" smtClean="0"/>
               <a:pPr/>
-              <a:t>6/29/2016</a:t>
+              <a:t>2/18/2017</a:t>
             </a:fld>
             <a:endParaRPr lang="en-US"/>
           </a:p>
@@ -3041,7 +3041,7 @@
             <a:fld id="{1D8BD707-D9CF-40AE-B4C6-C98DA3205C09}" type="datetimeFigureOut">
               <a:rPr lang="en-US" smtClean="0"/>
               <a:pPr/>
-              <a:t>6/29/2016</a:t>
+              <a:t>2/18/2017</a:t>
             </a:fld>
             <a:endParaRPr lang="en-US"/>
           </a:p>
@@ -3156,7 +3156,7 @@
             <a:fld id="{1D8BD707-D9CF-40AE-B4C6-C98DA3205C09}" type="datetimeFigureOut">
               <a:rPr lang="en-US" smtClean="0"/>
               <a:pPr/>
-              <a:t>6/29/2016</a:t>
+              <a:t>2/18/2017</a:t>
             </a:fld>
             <a:endParaRPr lang="en-US"/>
           </a:p>
@@ -3248,7 +3248,7 @@
             <a:fld id="{1D8BD707-D9CF-40AE-B4C6-C98DA3205C09}" type="datetimeFigureOut">
               <a:rPr lang="en-US" smtClean="0"/>
               <a:pPr/>
-              <a:t>6/29/2016</a:t>
+              <a:t>2/18/2017</a:t>
             </a:fld>
             <a:endParaRPr lang="en-US"/>
           </a:p>
@@ -3522,7 +3522,7 @@
             <a:fld id="{1D8BD707-D9CF-40AE-B4C6-C98DA3205C09}" type="datetimeFigureOut">
               <a:rPr lang="en-US" smtClean="0"/>
               <a:pPr/>
-              <a:t>6/29/2016</a:t>
+              <a:t>2/18/2017</a:t>
             </a:fld>
             <a:endParaRPr lang="en-US"/>
           </a:p>
@@ -3772,7 +3772,7 @@
             <a:fld id="{1D8BD707-D9CF-40AE-B4C6-C98DA3205C09}" type="datetimeFigureOut">
               <a:rPr lang="en-US" smtClean="0"/>
               <a:pPr/>
-              <a:t>6/29/2016</a:t>
+              <a:t>2/18/2017</a:t>
             </a:fld>
             <a:endParaRPr lang="en-US"/>
           </a:p>
@@ -3982,7 +3982,7 @@
             <a:fld id="{1D8BD707-D9CF-40AE-B4C6-C98DA3205C09}" type="datetimeFigureOut">
               <a:rPr lang="en-US" smtClean="0"/>
               <a:pPr/>
-              <a:t>6/29/2016</a:t>
+              <a:t>2/18/2017</a:t>
             </a:fld>
             <a:endParaRPr lang="en-US"/>
           </a:p>
@@ -17375,7 +17375,7 @@
                   </a:schemeClr>
                 </a:solidFill>
               </a:rPr>
-              <a:t>Documentation</a:t>
+              <a:t>User Guide </a:t>
             </a:r>
             <a:r>
               <a:rPr lang="en-US" dirty="0" smtClean="0">
@@ -17385,7 +17385,17 @@
                   </a:schemeClr>
                 </a:solidFill>
               </a:rPr>
-              <a:t> page of </a:t>
+              <a:t>page </a:t>
+            </a:r>
+            <a:r>
+              <a:rPr lang="en-US" dirty="0" smtClean="0">
+                <a:solidFill>
+                  <a:schemeClr val="accent6">
+                    <a:lumMod val="75000"/>
+                  </a:schemeClr>
+                </a:solidFill>
+              </a:rPr>
+              <a:t>of </a:t>
             </a:r>
             <a:r>
               <a:rPr lang="en-US" dirty="0" smtClean="0">
@@ -20029,7 +20039,7 @@
                 </a:solidFill>
                 <a:hlinkClick r:id="rId2"/>
               </a:rPr>
-              <a:t>documentation on our website</a:t>
+              <a:t>user guide on our website</a:t>
             </a:r>
             <a:r>
               <a:rPr lang="en-US" dirty="0" smtClean="0">
@@ -20041,6 +20051,13 @@
               </a:rPr>
               <a:t>.</a:t>
             </a:r>
+            <a:endParaRPr lang="en-US" dirty="0" smtClean="0">
+              <a:solidFill>
+                <a:schemeClr val="accent6">
+                  <a:lumMod val="75000"/>
+                </a:schemeClr>
+              </a:solidFill>
+            </a:endParaRPr>
           </a:p>
           <a:p>
             <a:pPr algn="ctr"/>
@@ -22318,7 +22335,7 @@
                 </a:solidFill>
                 <a:hlinkClick r:id="rId3"/>
               </a:rPr>
-              <a:t>http://PowerPointLabs.info/docs.html</a:t>
+              <a:t>http://</a:t>
             </a:r>
             <a:r>
               <a:rPr lang="en-US" dirty="0" smtClean="0">
@@ -22327,8 +22344,9 @@
                     <a:lumMod val="75000"/>
                   </a:schemeClr>
                 </a:solidFill>
-              </a:rPr>
-              <a:t>  </a:t>
+                <a:hlinkClick r:id="rId3"/>
+              </a:rPr>
+              <a:t>PowerPointLabs.info/docs/</a:t>
             </a:r>
             <a:endParaRPr lang="en-SG" dirty="0">
               <a:solidFill>

</xml_diff>